<commit_message>
JHS - 251113 - social login get JWT token, refresh OK, logOut button create
</commit_message>
<xml_diff>
--- a/소셜 로그인 발표.pptx
+++ b/소셜 로그인 발표.pptx
@@ -208,7 +208,7 @@
           <a:p>
             <a:fld id="{8A118C8B-A477-48FE-84D9-CD6F511B9ECA}" type="datetimeFigureOut">
               <a:rPr lang="ko-KR" altLang="en-US" smtClean="0"/>
-              <a:t>2025-11-13</a:t>
+              <a:t>2025-11-14</a:t>
             </a:fld>
             <a:endParaRPr lang="ko-KR" altLang="en-US"/>
           </a:p>
@@ -829,7 +829,7 @@
           <a:p>
             <a:fld id="{72B5172D-2C30-4AE0-A98E-CFE64EE5FA6C}" type="datetimeFigureOut">
               <a:rPr lang="ko-KR" altLang="en-US" smtClean="0"/>
-              <a:t>2025-11-13</a:t>
+              <a:t>2025-11-14</a:t>
             </a:fld>
             <a:endParaRPr lang="ko-KR" altLang="en-US"/>
           </a:p>
@@ -1027,7 +1027,7 @@
           <a:p>
             <a:fld id="{72B5172D-2C30-4AE0-A98E-CFE64EE5FA6C}" type="datetimeFigureOut">
               <a:rPr lang="ko-KR" altLang="en-US" smtClean="0"/>
-              <a:t>2025-11-13</a:t>
+              <a:t>2025-11-14</a:t>
             </a:fld>
             <a:endParaRPr lang="ko-KR" altLang="en-US"/>
           </a:p>
@@ -1235,7 +1235,7 @@
           <a:p>
             <a:fld id="{72B5172D-2C30-4AE0-A98E-CFE64EE5FA6C}" type="datetimeFigureOut">
               <a:rPr lang="ko-KR" altLang="en-US" smtClean="0"/>
-              <a:t>2025-11-13</a:t>
+              <a:t>2025-11-14</a:t>
             </a:fld>
             <a:endParaRPr lang="ko-KR" altLang="en-US"/>
           </a:p>
@@ -1433,7 +1433,7 @@
           <a:p>
             <a:fld id="{72B5172D-2C30-4AE0-A98E-CFE64EE5FA6C}" type="datetimeFigureOut">
               <a:rPr lang="ko-KR" altLang="en-US" smtClean="0"/>
-              <a:t>2025-11-13</a:t>
+              <a:t>2025-11-14</a:t>
             </a:fld>
             <a:endParaRPr lang="ko-KR" altLang="en-US"/>
           </a:p>
@@ -1708,7 +1708,7 @@
           <a:p>
             <a:fld id="{72B5172D-2C30-4AE0-A98E-CFE64EE5FA6C}" type="datetimeFigureOut">
               <a:rPr lang="ko-KR" altLang="en-US" smtClean="0"/>
-              <a:t>2025-11-13</a:t>
+              <a:t>2025-11-14</a:t>
             </a:fld>
             <a:endParaRPr lang="ko-KR" altLang="en-US"/>
           </a:p>
@@ -1973,7 +1973,7 @@
           <a:p>
             <a:fld id="{72B5172D-2C30-4AE0-A98E-CFE64EE5FA6C}" type="datetimeFigureOut">
               <a:rPr lang="ko-KR" altLang="en-US" smtClean="0"/>
-              <a:t>2025-11-13</a:t>
+              <a:t>2025-11-14</a:t>
             </a:fld>
             <a:endParaRPr lang="ko-KR" altLang="en-US"/>
           </a:p>
@@ -2385,7 +2385,7 @@
           <a:p>
             <a:fld id="{72B5172D-2C30-4AE0-A98E-CFE64EE5FA6C}" type="datetimeFigureOut">
               <a:rPr lang="ko-KR" altLang="en-US" smtClean="0"/>
-              <a:t>2025-11-13</a:t>
+              <a:t>2025-11-14</a:t>
             </a:fld>
             <a:endParaRPr lang="ko-KR" altLang="en-US"/>
           </a:p>
@@ -2526,7 +2526,7 @@
           <a:p>
             <a:fld id="{72B5172D-2C30-4AE0-A98E-CFE64EE5FA6C}" type="datetimeFigureOut">
               <a:rPr lang="ko-KR" altLang="en-US" smtClean="0"/>
-              <a:t>2025-11-13</a:t>
+              <a:t>2025-11-14</a:t>
             </a:fld>
             <a:endParaRPr lang="ko-KR" altLang="en-US"/>
           </a:p>
@@ -2639,7 +2639,7 @@
           <a:p>
             <a:fld id="{72B5172D-2C30-4AE0-A98E-CFE64EE5FA6C}" type="datetimeFigureOut">
               <a:rPr lang="ko-KR" altLang="en-US" smtClean="0"/>
-              <a:t>2025-11-13</a:t>
+              <a:t>2025-11-14</a:t>
             </a:fld>
             <a:endParaRPr lang="ko-KR" altLang="en-US"/>
           </a:p>
@@ -2950,7 +2950,7 @@
           <a:p>
             <a:fld id="{72B5172D-2C30-4AE0-A98E-CFE64EE5FA6C}" type="datetimeFigureOut">
               <a:rPr lang="ko-KR" altLang="en-US" smtClean="0"/>
-              <a:t>2025-11-13</a:t>
+              <a:t>2025-11-14</a:t>
             </a:fld>
             <a:endParaRPr lang="ko-KR" altLang="en-US"/>
           </a:p>
@@ -3238,7 +3238,7 @@
           <a:p>
             <a:fld id="{72B5172D-2C30-4AE0-A98E-CFE64EE5FA6C}" type="datetimeFigureOut">
               <a:rPr lang="ko-KR" altLang="en-US" smtClean="0"/>
-              <a:t>2025-11-13</a:t>
+              <a:t>2025-11-14</a:t>
             </a:fld>
             <a:endParaRPr lang="ko-KR" altLang="en-US"/>
           </a:p>
@@ -3479,7 +3479,7 @@
           <a:p>
             <a:fld id="{72B5172D-2C30-4AE0-A98E-CFE64EE5FA6C}" type="datetimeFigureOut">
               <a:rPr lang="ko-KR" altLang="en-US" smtClean="0"/>
-              <a:t>2025-11-13</a:t>
+              <a:t>2025-11-14</a:t>
             </a:fld>
             <a:endParaRPr lang="ko-KR" altLang="en-US"/>
           </a:p>
@@ -4453,12 +4453,31 @@
               <a:buAutoNum type="arabicParenR"/>
             </a:pPr>
             <a:r>
-              <a:rPr lang="en-US" altLang="ko-KR" u="sng">
+              <a:rPr lang="en-US" altLang="ko-KR" u="sng" dirty="0">
                 <a:hlinkClick r:id="rId4"/>
               </a:rPr>
               <a:t>https://developers.kakao.com/docs/latest/ko/kakaologin/rest-api#logout</a:t>
             </a:r>
+            <a:endParaRPr lang="en-US" altLang="ko-KR" u="sng" dirty="0"/>
+          </a:p>
+          <a:p>
+            <a:pPr marL="1200150" lvl="1" indent="-742950">
+              <a:buAutoNum type="arabicParenR"/>
+            </a:pPr>
             <a:endParaRPr lang="en-US" altLang="ko-KR" dirty="0"/>
+          </a:p>
+          <a:p>
+            <a:pPr marL="742950" indent="-742950">
+              <a:buAutoNum type="arabicParenR"/>
+            </a:pPr>
+            <a:r>
+              <a:rPr lang="ko-KR" altLang="en-US" dirty="0"/>
+              <a:t>구글 소셜 로그인은 방식이 다르다</a:t>
+            </a:r>
+            <a:r>
+              <a:rPr lang="en-US" altLang="ko-KR" dirty="0"/>
+              <a:t>?</a:t>
+            </a:r>
           </a:p>
         </p:txBody>
       </p:sp>
@@ -4573,8 +4592,8 @@
         </p:nvSpPr>
         <p:spPr>
           <a:xfrm>
-            <a:off x="871756" y="1996580"/>
-            <a:ext cx="10654715" cy="3359791"/>
+            <a:off x="871756" y="1358020"/>
+            <a:ext cx="10654715" cy="5232903"/>
           </a:xfrm>
           <a:prstGeom prst="rect">
             <a:avLst/>
@@ -4637,6 +4656,51 @@
                 <a:hlinkClick r:id="rId3"/>
               </a:rPr>
               <a:t>https://suyeoniii.tistory.com/81</a:t>
+            </a:r>
+            <a:endParaRPr lang="en-US" altLang="ko-KR" sz="3200" dirty="0"/>
+          </a:p>
+          <a:p>
+            <a:endParaRPr lang="en-US" altLang="ko-KR" sz="3200" dirty="0"/>
+          </a:p>
+          <a:p>
+            <a:r>
+              <a:rPr lang="ko-KR" altLang="en-US" sz="3200" dirty="0"/>
+              <a:t>깃 주소 </a:t>
+            </a:r>
+            <a:r>
+              <a:rPr lang="en-US" altLang="ko-KR" sz="3200" dirty="0"/>
+              <a:t>: </a:t>
+            </a:r>
+            <a:r>
+              <a:rPr lang="en-US" altLang="ko-KR" sz="3200" dirty="0">
+                <a:hlinkClick r:id="rId4"/>
+              </a:rPr>
+              <a:t>https://github.com/JHS3427/SocialLoginPresentation</a:t>
+            </a:r>
+            <a:endParaRPr lang="en-US" altLang="ko-KR" sz="3200" dirty="0"/>
+          </a:p>
+          <a:p>
+            <a:endParaRPr lang="en-US" altLang="ko-KR" sz="3200" dirty="0"/>
+          </a:p>
+          <a:p>
+            <a:r>
+              <a:rPr lang="ko-KR" altLang="en-US" sz="3200" dirty="0"/>
+              <a:t>깃 다운로드 </a:t>
+            </a:r>
+            <a:r>
+              <a:rPr lang="en-US" altLang="ko-KR" sz="3200" dirty="0"/>
+              <a:t>:</a:t>
+            </a:r>
+            <a:br>
+              <a:rPr lang="en-US" altLang="ko-KR" sz="3200" dirty="0"/>
+            </a:br>
+            <a:r>
+              <a:rPr lang="en-US" altLang="ko-KR" sz="3200" dirty="0"/>
+              <a:t>git clone git@github.com:JHS3427/</a:t>
+            </a:r>
+            <a:r>
+              <a:rPr lang="en-US" altLang="ko-KR" sz="3200" dirty="0" err="1"/>
+              <a:t>SocialLoginPresentation.git</a:t>
             </a:r>
             <a:endParaRPr lang="en-US" altLang="ko-KR" sz="3200" dirty="0"/>
           </a:p>

</xml_diff>